<commit_message>
Commit final: correcciones en los docs. Cambios en guest para no poder acceder al chat ni enviar incidencias.
</commit_message>
<xml_diff>
--- a/Docs/Documento de diseño Cat-Attack.pptx
+++ b/Docs/Documento de diseño Cat-Attack.pptx
@@ -21,6 +21,11 @@
     <p:sldId id="265" r:id="rId15"/>
     <p:sldId id="271" r:id="rId16"/>
     <p:sldId id="269" r:id="rId17"/>
+    <p:sldId id="274" r:id="rId18"/>
+    <p:sldId id="275" r:id="rId19"/>
+    <p:sldId id="276" r:id="rId20"/>
+    <p:sldId id="277" r:id="rId21"/>
+    <p:sldId id="278" r:id="rId22"/>
   </p:sldIdLst>
   <p:sldSz cx="12192000" cy="6858000"/>
   <p:notesSz cx="6858000" cy="9144000"/>
@@ -16812,98 +16817,6 @@
       </p:sp>
       <p:sp>
         <p:nvSpPr>
-          <p:cNvPr id="14" name="Rectangle 10">
-            <a:extLst>
-              <a:ext uri="{FF2B5EF4-FFF2-40B4-BE49-F238E27FC236}">
-                <a16:creationId xmlns:a16="http://schemas.microsoft.com/office/drawing/2014/main" id="{29C8EECF-C1D9-4A22-9FD3-FA6C5996270A}"/>
-              </a:ext>
-            </a:extLst>
-          </p:cNvPr>
-          <p:cNvSpPr/>
-          <p:nvPr/>
-        </p:nvSpPr>
-        <p:spPr>
-          <a:xfrm>
-            <a:off x="9610453" y="1450481"/>
-            <a:ext cx="1939955" cy="400110"/>
-          </a:xfrm>
-          <a:prstGeom prst="rect">
-            <a:avLst/>
-          </a:prstGeom>
-          <a:noFill/>
-        </p:spPr>
-        <p:txBody>
-          <a:bodyPr wrap="none" lIns="91440" tIns="45720" rIns="91440" bIns="45720">
-            <a:spAutoFit/>
-          </a:bodyPr>
-          <a:lstStyle/>
-          <a:p>
-            <a:r>
-              <a:rPr lang="en-US" sz="2000" b="0" cap="none" spc="0" dirty="0" err="1">
-                <a:ln w="0"/>
-                <a:solidFill>
-                  <a:schemeClr val="tx1"/>
-                </a:solidFill>
-                <a:effectLst>
-                  <a:outerShdw blurRad="38100" dist="19050" dir="2700000" algn="tl" rotWithShape="0">
-                    <a:schemeClr val="dk1">
-                      <a:alpha val="40000"/>
-                    </a:schemeClr>
-                  </a:outerShdw>
-                </a:effectLst>
-              </a:rPr>
-              <a:t>Usuario</a:t>
-            </a:r>
-            <a:r>
-              <a:rPr lang="en-US" sz="2000" b="0" cap="none" spc="0" dirty="0">
-                <a:ln w="0"/>
-                <a:solidFill>
-                  <a:schemeClr val="tx1"/>
-                </a:solidFill>
-                <a:effectLst>
-                  <a:outerShdw blurRad="38100" dist="19050" dir="2700000" algn="tl" rotWithShape="0">
-                    <a:schemeClr val="dk1">
-                      <a:alpha val="40000"/>
-                    </a:schemeClr>
-                  </a:outerShdw>
-                </a:effectLst>
-              </a:rPr>
-              <a:t> </a:t>
-            </a:r>
-            <a:r>
-              <a:rPr lang="en-US" sz="2000" b="0" cap="none" spc="0" dirty="0" err="1">
-                <a:ln w="0"/>
-                <a:solidFill>
-                  <a:schemeClr val="tx1"/>
-                </a:solidFill>
-                <a:effectLst>
-                  <a:outerShdw blurRad="38100" dist="19050" dir="2700000" algn="tl" rotWithShape="0">
-                    <a:schemeClr val="dk1">
-                      <a:alpha val="40000"/>
-                    </a:schemeClr>
-                  </a:outerShdw>
-                </a:effectLst>
-              </a:rPr>
-              <a:t>emisor</a:t>
-            </a:r>
-            <a:endParaRPr lang="en-US" sz="2000" b="0" cap="none" spc="0" dirty="0">
-              <a:ln w="0"/>
-              <a:solidFill>
-                <a:schemeClr val="tx1"/>
-              </a:solidFill>
-              <a:effectLst>
-                <a:outerShdw blurRad="38100" dist="19050" dir="2700000" algn="tl" rotWithShape="0">
-                  <a:schemeClr val="dk1">
-                    <a:alpha val="40000"/>
-                  </a:schemeClr>
-                </a:outerShdw>
-              </a:effectLst>
-            </a:endParaRPr>
-          </a:p>
-        </p:txBody>
-      </p:sp>
-      <p:sp>
-        <p:nvSpPr>
           <p:cNvPr id="15" name="Rectangle 7">
             <a:extLst>
               <a:ext uri="{FF2B5EF4-FFF2-40B4-BE49-F238E27FC236}">
@@ -16993,98 +16906,6 @@
                 </a:effectLst>
               </a:rPr>
               <a:t>Detalles</a:t>
-            </a:r>
-            <a:endParaRPr lang="en-US" sz="2000" b="0" cap="none" spc="0" dirty="0">
-              <a:ln w="0"/>
-              <a:solidFill>
-                <a:schemeClr val="tx1"/>
-              </a:solidFill>
-              <a:effectLst>
-                <a:outerShdw blurRad="38100" dist="19050" dir="2700000" algn="tl" rotWithShape="0">
-                  <a:schemeClr val="dk1">
-                    <a:alpha val="40000"/>
-                  </a:schemeClr>
-                </a:outerShdw>
-              </a:effectLst>
-            </a:endParaRPr>
-          </a:p>
-        </p:txBody>
-      </p:sp>
-      <p:sp>
-        <p:nvSpPr>
-          <p:cNvPr id="16" name="Rectangle 10">
-            <a:extLst>
-              <a:ext uri="{FF2B5EF4-FFF2-40B4-BE49-F238E27FC236}">
-                <a16:creationId xmlns:a16="http://schemas.microsoft.com/office/drawing/2014/main" id="{3D9E0167-78E5-46E6-9FBC-F1CD9D105AEC}"/>
-              </a:ext>
-            </a:extLst>
-          </p:cNvPr>
-          <p:cNvSpPr/>
-          <p:nvPr/>
-        </p:nvSpPr>
-        <p:spPr>
-          <a:xfrm>
-            <a:off x="9610453" y="3734972"/>
-            <a:ext cx="1939955" cy="400110"/>
-          </a:xfrm>
-          <a:prstGeom prst="rect">
-            <a:avLst/>
-          </a:prstGeom>
-          <a:noFill/>
-        </p:spPr>
-        <p:txBody>
-          <a:bodyPr wrap="none" lIns="91440" tIns="45720" rIns="91440" bIns="45720">
-            <a:spAutoFit/>
-          </a:bodyPr>
-          <a:lstStyle/>
-          <a:p>
-            <a:r>
-              <a:rPr lang="en-US" sz="2000" b="0" cap="none" spc="0" dirty="0" err="1">
-                <a:ln w="0"/>
-                <a:solidFill>
-                  <a:schemeClr val="tx1"/>
-                </a:solidFill>
-                <a:effectLst>
-                  <a:outerShdw blurRad="38100" dist="19050" dir="2700000" algn="tl" rotWithShape="0">
-                    <a:schemeClr val="dk1">
-                      <a:alpha val="40000"/>
-                    </a:schemeClr>
-                  </a:outerShdw>
-                </a:effectLst>
-              </a:rPr>
-              <a:t>Usuario</a:t>
-            </a:r>
-            <a:r>
-              <a:rPr lang="en-US" sz="2000" b="0" cap="none" spc="0" dirty="0">
-                <a:ln w="0"/>
-                <a:solidFill>
-                  <a:schemeClr val="tx1"/>
-                </a:solidFill>
-                <a:effectLst>
-                  <a:outerShdw blurRad="38100" dist="19050" dir="2700000" algn="tl" rotWithShape="0">
-                    <a:schemeClr val="dk1">
-                      <a:alpha val="40000"/>
-                    </a:schemeClr>
-                  </a:outerShdw>
-                </a:effectLst>
-              </a:rPr>
-              <a:t> </a:t>
-            </a:r>
-            <a:r>
-              <a:rPr lang="en-US" sz="2000" b="0" cap="none" spc="0" dirty="0" err="1">
-                <a:ln w="0"/>
-                <a:solidFill>
-                  <a:schemeClr val="tx1"/>
-                </a:solidFill>
-                <a:effectLst>
-                  <a:outerShdw blurRad="38100" dist="19050" dir="2700000" algn="tl" rotWithShape="0">
-                    <a:schemeClr val="dk1">
-                      <a:alpha val="40000"/>
-                    </a:schemeClr>
-                  </a:outerShdw>
-                </a:effectLst>
-              </a:rPr>
-              <a:t>emisor</a:t>
             </a:r>
             <a:endParaRPr lang="en-US" sz="2000" b="0" cap="none" spc="0" dirty="0">
               <a:ln w="0"/>
@@ -17156,7 +16977,7 @@
                   <a:schemeClr val="bg1"/>
                 </a:solidFill>
               </a:rPr>
-              <a:t>Resolver incidencia</a:t>
+              <a:t>Borrar</a:t>
             </a:r>
             <a:endParaRPr lang="en-US" sz="2000" dirty="0">
               <a:solidFill>
@@ -17220,7 +17041,135 @@
                   <a:schemeClr val="bg1"/>
                 </a:solidFill>
               </a:rPr>
-              <a:t>Resolver incidencia</a:t>
+              <a:t>Borrar</a:t>
+            </a:r>
+            <a:endParaRPr lang="en-US" sz="2000" dirty="0">
+              <a:solidFill>
+                <a:schemeClr val="bg1"/>
+              </a:solidFill>
+            </a:endParaRPr>
+          </a:p>
+        </p:txBody>
+      </p:sp>
+      <p:sp>
+        <p:nvSpPr>
+          <p:cNvPr id="12" name="Rectangle: Rounded Corners 7">
+            <a:extLst>
+              <a:ext uri="{FF2B5EF4-FFF2-40B4-BE49-F238E27FC236}">
+                <a16:creationId xmlns:a16="http://schemas.microsoft.com/office/drawing/2014/main" id="{4A3D23B0-944A-4D55-A3E4-7967CE83A9C3}"/>
+              </a:ext>
+            </a:extLst>
+          </p:cNvPr>
+          <p:cNvSpPr/>
+          <p:nvPr/>
+        </p:nvSpPr>
+        <p:spPr>
+          <a:xfrm>
+            <a:off x="5791234" y="2561971"/>
+            <a:ext cx="2782036" cy="717205"/>
+          </a:xfrm>
+          <a:prstGeom prst="roundRect">
+            <a:avLst/>
+          </a:prstGeom>
+          <a:solidFill>
+            <a:srgbClr val="00B050"/>
+          </a:solidFill>
+          <a:ln>
+            <a:noFill/>
+          </a:ln>
+        </p:spPr>
+        <p:style>
+          <a:lnRef idx="2">
+            <a:schemeClr val="accent1">
+              <a:shade val="50000"/>
+            </a:schemeClr>
+          </a:lnRef>
+          <a:fillRef idx="1">
+            <a:schemeClr val="accent1"/>
+          </a:fillRef>
+          <a:effectRef idx="0">
+            <a:schemeClr val="accent1"/>
+          </a:effectRef>
+          <a:fontRef idx="minor">
+            <a:schemeClr val="lt1"/>
+          </a:fontRef>
+        </p:style>
+        <p:txBody>
+          <a:bodyPr rtlCol="0" anchor="ctr"/>
+          <a:lstStyle/>
+          <a:p>
+            <a:pPr algn="ctr"/>
+            <a:r>
+              <a:rPr lang="es-VE" sz="2000" dirty="0">
+                <a:solidFill>
+                  <a:schemeClr val="bg1"/>
+                </a:solidFill>
+              </a:rPr>
+              <a:t>Resolver</a:t>
+            </a:r>
+            <a:endParaRPr lang="en-US" sz="2000" dirty="0">
+              <a:solidFill>
+                <a:schemeClr val="bg1"/>
+              </a:solidFill>
+            </a:endParaRPr>
+          </a:p>
+        </p:txBody>
+      </p:sp>
+      <p:sp>
+        <p:nvSpPr>
+          <p:cNvPr id="18" name="Rectangle: Rounded Corners 7">
+            <a:extLst>
+              <a:ext uri="{FF2B5EF4-FFF2-40B4-BE49-F238E27FC236}">
+                <a16:creationId xmlns:a16="http://schemas.microsoft.com/office/drawing/2014/main" id="{A107556D-4CB6-4365-824C-F908F5171AFA}"/>
+              </a:ext>
+            </a:extLst>
+          </p:cNvPr>
+          <p:cNvSpPr/>
+          <p:nvPr/>
+        </p:nvSpPr>
+        <p:spPr>
+          <a:xfrm>
+            <a:off x="5791234" y="4864922"/>
+            <a:ext cx="2782036" cy="717205"/>
+          </a:xfrm>
+          <a:prstGeom prst="roundRect">
+            <a:avLst/>
+          </a:prstGeom>
+          <a:solidFill>
+            <a:srgbClr val="00B050"/>
+          </a:solidFill>
+          <a:ln>
+            <a:noFill/>
+          </a:ln>
+        </p:spPr>
+        <p:style>
+          <a:lnRef idx="2">
+            <a:schemeClr val="accent1">
+              <a:shade val="50000"/>
+            </a:schemeClr>
+          </a:lnRef>
+          <a:fillRef idx="1">
+            <a:schemeClr val="accent1"/>
+          </a:fillRef>
+          <a:effectRef idx="0">
+            <a:schemeClr val="accent1"/>
+          </a:effectRef>
+          <a:fontRef idx="minor">
+            <a:schemeClr val="lt1"/>
+          </a:fontRef>
+        </p:style>
+        <p:txBody>
+          <a:bodyPr rtlCol="0" anchor="ctr"/>
+          <a:lstStyle/>
+          <a:p>
+            <a:pPr algn="ctr"/>
+            <a:r>
+              <a:rPr lang="es-VE" sz="2000" dirty="0">
+                <a:solidFill>
+                  <a:schemeClr val="bg1"/>
+                </a:solidFill>
+              </a:rPr>
+              <a:t>Resolver</a:t>
             </a:r>
             <a:endParaRPr lang="en-US" sz="2000" dirty="0">
               <a:solidFill>
@@ -18394,6 +18343,788 @@
 </p:sld>
 </file>
 
+<file path=ppt/slides/slide17.xml><?xml version="1.0" encoding="utf-8"?>
+<p:sld xmlns:a="http://schemas.openxmlformats.org/drawingml/2006/main" xmlns:r="http://schemas.openxmlformats.org/officeDocument/2006/relationships" xmlns:p="http://schemas.openxmlformats.org/presentationml/2006/main">
+  <p:cSld>
+    <p:spTree>
+      <p:nvGrpSpPr>
+        <p:cNvPr id="1" name=""/>
+        <p:cNvGrpSpPr/>
+        <p:nvPr/>
+      </p:nvGrpSpPr>
+      <p:grpSpPr>
+        <a:xfrm>
+          <a:off x="0" y="0"/>
+          <a:ext cx="0" cy="0"/>
+          <a:chOff x="0" y="0"/>
+          <a:chExt cx="0" cy="0"/>
+        </a:xfrm>
+      </p:grpSpPr>
+      <p:sp>
+        <p:nvSpPr>
+          <p:cNvPr id="2" name="Rectangle 1">
+            <a:extLst>
+              <a:ext uri="{FF2B5EF4-FFF2-40B4-BE49-F238E27FC236}">
+                <a16:creationId xmlns:a16="http://schemas.microsoft.com/office/drawing/2014/main" id="{10843CF8-49A6-4FAE-9CA5-E01E74755B2A}"/>
+              </a:ext>
+            </a:extLst>
+          </p:cNvPr>
+          <p:cNvSpPr/>
+          <p:nvPr/>
+        </p:nvSpPr>
+        <p:spPr>
+          <a:xfrm>
+            <a:off x="1416674" y="2037542"/>
+            <a:ext cx="9358652" cy="2554545"/>
+          </a:xfrm>
+          <a:prstGeom prst="rect">
+            <a:avLst/>
+          </a:prstGeom>
+          <a:noFill/>
+        </p:spPr>
+        <p:txBody>
+          <a:bodyPr wrap="none" lIns="91440" tIns="45720" rIns="91440" bIns="45720">
+            <a:spAutoFit/>
+          </a:bodyPr>
+          <a:lstStyle/>
+          <a:p>
+            <a:pPr algn="ctr"/>
+            <a:r>
+              <a:rPr lang="en-US" sz="8000" b="1" dirty="0">
+                <a:ln w="10160">
+                  <a:solidFill>
+                    <a:schemeClr val="tx1"/>
+                  </a:solidFill>
+                  <a:prstDash val="solid"/>
+                </a:ln>
+                <a:solidFill>
+                  <a:srgbClr val="FFFFFF"/>
+                </a:solidFill>
+                <a:effectLst>
+                  <a:outerShdw blurRad="38100" dist="22860" dir="5400000" algn="tl" rotWithShape="0">
+                    <a:srgbClr val="000000">
+                      <a:alpha val="30000"/>
+                    </a:srgbClr>
+                  </a:outerShdw>
+                </a:effectLst>
+              </a:rPr>
+              <a:t>ARQUITECTURA DE </a:t>
+            </a:r>
+          </a:p>
+          <a:p>
+            <a:pPr algn="ctr"/>
+            <a:r>
+              <a:rPr lang="en-US" sz="8000" b="1" dirty="0">
+                <a:ln w="10160">
+                  <a:solidFill>
+                    <a:schemeClr val="tx1"/>
+                  </a:solidFill>
+                  <a:prstDash val="solid"/>
+                </a:ln>
+                <a:solidFill>
+                  <a:srgbClr val="FFFFFF"/>
+                </a:solidFill>
+                <a:effectLst>
+                  <a:outerShdw blurRad="38100" dist="22860" dir="5400000" algn="tl" rotWithShape="0">
+                    <a:srgbClr val="000000">
+                      <a:alpha val="30000"/>
+                    </a:srgbClr>
+                  </a:outerShdw>
+                </a:effectLst>
+              </a:rPr>
+              <a:t>CAT-ATTACK</a:t>
+            </a:r>
+            <a:endParaRPr lang="en-US" sz="9800" b="1" cap="none" spc="0" dirty="0">
+              <a:ln w="10160">
+                <a:solidFill>
+                  <a:schemeClr val="tx1"/>
+                </a:solidFill>
+                <a:prstDash val="solid"/>
+              </a:ln>
+              <a:solidFill>
+                <a:srgbClr val="FFFFFF"/>
+              </a:solidFill>
+              <a:effectLst>
+                <a:outerShdw blurRad="38100" dist="22860" dir="5400000" algn="tl" rotWithShape="0">
+                  <a:srgbClr val="000000">
+                    <a:alpha val="30000"/>
+                  </a:srgbClr>
+                </a:outerShdw>
+              </a:effectLst>
+            </a:endParaRPr>
+          </a:p>
+        </p:txBody>
+      </p:sp>
+    </p:spTree>
+    <p:extLst>
+      <p:ext uri="{BB962C8B-B14F-4D97-AF65-F5344CB8AC3E}">
+        <p14:creationId xmlns:p14="http://schemas.microsoft.com/office/powerpoint/2010/main" val="360016224"/>
+      </p:ext>
+    </p:extLst>
+  </p:cSld>
+  <p:clrMapOvr>
+    <a:masterClrMapping/>
+  </p:clrMapOvr>
+</p:sld>
+</file>
+
+<file path=ppt/slides/slide18.xml><?xml version="1.0" encoding="utf-8"?>
+<p:sld xmlns:a="http://schemas.openxmlformats.org/drawingml/2006/main" xmlns:r="http://schemas.openxmlformats.org/officeDocument/2006/relationships" xmlns:p="http://schemas.openxmlformats.org/presentationml/2006/main">
+  <p:cSld>
+    <p:spTree>
+      <p:nvGrpSpPr>
+        <p:cNvPr id="1" name=""/>
+        <p:cNvGrpSpPr/>
+        <p:nvPr/>
+      </p:nvGrpSpPr>
+      <p:grpSpPr>
+        <a:xfrm>
+          <a:off x="0" y="0"/>
+          <a:ext cx="0" cy="0"/>
+          <a:chOff x="0" y="0"/>
+          <a:chExt cx="0" cy="0"/>
+        </a:xfrm>
+      </p:grpSpPr>
+      <p:sp>
+        <p:nvSpPr>
+          <p:cNvPr id="3" name="Rectangle 1">
+            <a:extLst>
+              <a:ext uri="{FF2B5EF4-FFF2-40B4-BE49-F238E27FC236}">
+                <a16:creationId xmlns:a16="http://schemas.microsoft.com/office/drawing/2014/main" id="{6F7AC910-5847-41EC-95CE-CD38BCA3BCD8}"/>
+              </a:ext>
+            </a:extLst>
+          </p:cNvPr>
+          <p:cNvSpPr/>
+          <p:nvPr/>
+        </p:nvSpPr>
+        <p:spPr>
+          <a:xfrm>
+            <a:off x="94695" y="106531"/>
+            <a:ext cx="12002610" cy="905523"/>
+          </a:xfrm>
+          <a:prstGeom prst="rect">
+            <a:avLst/>
+          </a:prstGeom>
+          <a:solidFill>
+            <a:schemeClr val="tx1">
+              <a:lumMod val="65000"/>
+              <a:lumOff val="35000"/>
+            </a:schemeClr>
+          </a:solidFill>
+          <a:ln>
+            <a:noFill/>
+          </a:ln>
+        </p:spPr>
+        <p:style>
+          <a:lnRef idx="2">
+            <a:schemeClr val="accent1">
+              <a:shade val="50000"/>
+            </a:schemeClr>
+          </a:lnRef>
+          <a:fillRef idx="1">
+            <a:schemeClr val="accent1"/>
+          </a:fillRef>
+          <a:effectRef idx="0">
+            <a:schemeClr val="accent1"/>
+          </a:effectRef>
+          <a:fontRef idx="minor">
+            <a:schemeClr val="lt1"/>
+          </a:fontRef>
+        </p:style>
+        <p:txBody>
+          <a:bodyPr rtlCol="0" anchor="ctr"/>
+          <a:lstStyle/>
+          <a:p>
+            <a:pPr algn="ctr"/>
+            <a:r>
+              <a:rPr lang="es-VE" b="1" dirty="0">
+                <a:solidFill>
+                  <a:schemeClr val="bg1"/>
+                </a:solidFill>
+              </a:rPr>
+              <a:t>Arquitecturas de Cat-</a:t>
+            </a:r>
+            <a:r>
+              <a:rPr lang="es-VE" b="1" dirty="0" err="1">
+                <a:solidFill>
+                  <a:schemeClr val="bg1"/>
+                </a:solidFill>
+              </a:rPr>
+              <a:t>Attack</a:t>
+            </a:r>
+            <a:endParaRPr lang="en-US" b="1" dirty="0">
+              <a:solidFill>
+                <a:schemeClr val="bg1"/>
+              </a:solidFill>
+            </a:endParaRPr>
+          </a:p>
+        </p:txBody>
+      </p:sp>
+      <p:sp>
+        <p:nvSpPr>
+          <p:cNvPr id="4" name="CuadroTexto 3">
+            <a:extLst>
+              <a:ext uri="{FF2B5EF4-FFF2-40B4-BE49-F238E27FC236}">
+                <a16:creationId xmlns:a16="http://schemas.microsoft.com/office/drawing/2014/main" id="{6D57F9F2-7C51-4BB2-8F0F-EC4704ABFDCD}"/>
+              </a:ext>
+            </a:extLst>
+          </p:cNvPr>
+          <p:cNvSpPr txBox="1"/>
+          <p:nvPr/>
+        </p:nvSpPr>
+        <p:spPr>
+          <a:xfrm>
+            <a:off x="409072" y="1126125"/>
+            <a:ext cx="9930065" cy="4801314"/>
+          </a:xfrm>
+          <a:prstGeom prst="rect">
+            <a:avLst/>
+          </a:prstGeom>
+          <a:noFill/>
+        </p:spPr>
+        <p:txBody>
+          <a:bodyPr wrap="square" rtlCol="0">
+            <a:spAutoFit/>
+          </a:bodyPr>
+          <a:lstStyle/>
+          <a:p>
+            <a:r>
+              <a:rPr lang="es-ES" b="1" dirty="0"/>
+              <a:t>Proyecto:</a:t>
+            </a:r>
+          </a:p>
+          <a:p>
+            <a:r>
+              <a:rPr lang="es-ES" dirty="0"/>
+              <a:t>El servidor está basado en el </a:t>
+            </a:r>
+            <a:r>
+              <a:rPr lang="es-ES" dirty="0" err="1"/>
+              <a:t>framework</a:t>
+            </a:r>
+            <a:r>
+              <a:rPr lang="es-ES" dirty="0"/>
+              <a:t> Express de Node.js</a:t>
+            </a:r>
+          </a:p>
+          <a:p>
+            <a:endParaRPr lang="es-ES" b="1" dirty="0"/>
+          </a:p>
+          <a:p>
+            <a:r>
+              <a:rPr lang="es-ES" b="1" dirty="0"/>
+              <a:t>Estructura del proyecto:</a:t>
+            </a:r>
+          </a:p>
+          <a:p>
+            <a:r>
+              <a:rPr lang="es-ES" dirty="0"/>
+              <a:t>Creada con Express </a:t>
+            </a:r>
+            <a:r>
+              <a:rPr lang="es-ES" dirty="0" err="1"/>
+              <a:t>Generator</a:t>
+            </a:r>
+            <a:r>
+              <a:rPr lang="es-ES" dirty="0"/>
+              <a:t>.</a:t>
+            </a:r>
+          </a:p>
+          <a:p>
+            <a:pPr marL="285750" indent="-285750">
+              <a:buFontTx/>
+              <a:buChar char="-"/>
+            </a:pPr>
+            <a:r>
+              <a:rPr lang="es-ES" dirty="0"/>
+              <a:t>/</a:t>
+            </a:r>
+            <a:r>
+              <a:rPr lang="es-ES" dirty="0" err="1"/>
+              <a:t>bin</a:t>
+            </a:r>
+            <a:r>
+              <a:rPr lang="es-ES" dirty="0"/>
+              <a:t>/www: Usado para iniciar el servidor</a:t>
+            </a:r>
+          </a:p>
+          <a:p>
+            <a:pPr marL="285750" indent="-285750">
+              <a:buFontTx/>
+              <a:buChar char="-"/>
+            </a:pPr>
+            <a:r>
+              <a:rPr lang="es-ES" dirty="0"/>
+              <a:t>/</a:t>
+            </a:r>
+            <a:r>
+              <a:rPr lang="es-ES" dirty="0" err="1"/>
+              <a:t>routes</a:t>
+            </a:r>
+            <a:r>
+              <a:rPr lang="es-ES" dirty="0"/>
+              <a:t>/: encaminamiento del servidor</a:t>
+            </a:r>
+          </a:p>
+          <a:p>
+            <a:pPr marL="285750" indent="-285750">
+              <a:buFontTx/>
+              <a:buChar char="-"/>
+            </a:pPr>
+            <a:r>
+              <a:rPr lang="es-ES" dirty="0"/>
+              <a:t>/</a:t>
+            </a:r>
+            <a:r>
+              <a:rPr lang="es-ES" dirty="0" err="1"/>
+              <a:t>public</a:t>
+            </a:r>
+            <a:r>
+              <a:rPr lang="es-ES" dirty="0"/>
+              <a:t>/: archivos estáticos</a:t>
+            </a:r>
+          </a:p>
+          <a:p>
+            <a:pPr marL="285750" indent="-285750">
+              <a:buFontTx/>
+              <a:buChar char="-"/>
+            </a:pPr>
+            <a:r>
+              <a:rPr lang="es-ES" dirty="0"/>
+              <a:t>/</a:t>
+            </a:r>
+            <a:r>
+              <a:rPr lang="es-ES" dirty="0" err="1"/>
+              <a:t>views</a:t>
+            </a:r>
+            <a:r>
+              <a:rPr lang="es-ES" dirty="0"/>
+              <a:t>/: </a:t>
+            </a:r>
+            <a:r>
+              <a:rPr lang="es-ES" dirty="0" err="1"/>
+              <a:t>templates</a:t>
+            </a:r>
+            <a:endParaRPr lang="es-ES" dirty="0"/>
+          </a:p>
+          <a:p>
+            <a:pPr marL="285750" indent="-285750">
+              <a:buFontTx/>
+              <a:buChar char="-"/>
+            </a:pPr>
+            <a:r>
+              <a:rPr lang="es-ES" dirty="0"/>
+              <a:t>/</a:t>
+            </a:r>
+            <a:r>
+              <a:rPr lang="es-ES" dirty="0" err="1"/>
+              <a:t>passport</a:t>
+            </a:r>
+            <a:r>
+              <a:rPr lang="es-ES" dirty="0"/>
+              <a:t>/: autenticación</a:t>
+            </a:r>
+          </a:p>
+          <a:p>
+            <a:pPr marL="285750" indent="-285750">
+              <a:buFontTx/>
+              <a:buChar char="-"/>
+            </a:pPr>
+            <a:r>
+              <a:rPr lang="es-ES" dirty="0"/>
+              <a:t>/</a:t>
+            </a:r>
+            <a:r>
+              <a:rPr lang="es-ES" dirty="0" err="1"/>
+              <a:t>models</a:t>
+            </a:r>
+            <a:r>
+              <a:rPr lang="es-ES" dirty="0"/>
+              <a:t>/: modelos (estructura de los objetos persistentes)</a:t>
+            </a:r>
+          </a:p>
+          <a:p>
+            <a:pPr marL="285750" indent="-285750">
+              <a:buFontTx/>
+              <a:buChar char="-"/>
+            </a:pPr>
+            <a:r>
+              <a:rPr lang="es-ES" dirty="0"/>
+              <a:t>index.js: lógica del servidor</a:t>
+            </a:r>
+          </a:p>
+          <a:p>
+            <a:pPr marL="285750" indent="-285750">
+              <a:buFontTx/>
+              <a:buChar char="-"/>
+            </a:pPr>
+            <a:r>
+              <a:rPr lang="es-ES" dirty="0"/>
+              <a:t>database.js: conexión a la BBDD</a:t>
+            </a:r>
+          </a:p>
+          <a:p>
+            <a:pPr marL="285750" indent="-285750">
+              <a:buFontTx/>
+              <a:buChar char="-"/>
+            </a:pPr>
+            <a:r>
+              <a:rPr lang="es-ES" dirty="0"/>
+              <a:t>keys.js: URI de conexión a </a:t>
+            </a:r>
+            <a:r>
+              <a:rPr lang="es-ES" dirty="0" err="1"/>
+              <a:t>mongoDB</a:t>
+            </a:r>
+            <a:endParaRPr lang="es-ES" dirty="0"/>
+          </a:p>
+          <a:p>
+            <a:pPr marL="285750" indent="-285750">
+              <a:buFontTx/>
+              <a:buChar char="-"/>
+            </a:pPr>
+            <a:endParaRPr lang="es-ES" dirty="0"/>
+          </a:p>
+          <a:p>
+            <a:r>
+              <a:rPr lang="es-ES" b="1" dirty="0" err="1"/>
+              <a:t>Template</a:t>
+            </a:r>
+            <a:r>
+              <a:rPr lang="es-ES" b="1" dirty="0"/>
+              <a:t>:</a:t>
+            </a:r>
+          </a:p>
+          <a:p>
+            <a:r>
+              <a:rPr lang="es-ES" dirty="0"/>
+              <a:t>Utilizamos el motor de </a:t>
+            </a:r>
+            <a:r>
+              <a:rPr lang="es-ES" dirty="0" err="1"/>
+              <a:t>templates</a:t>
+            </a:r>
+            <a:r>
+              <a:rPr lang="es-ES" dirty="0"/>
+              <a:t> </a:t>
+            </a:r>
+            <a:r>
+              <a:rPr lang="es-ES" b="1" dirty="0" err="1"/>
+              <a:t>Nunjucks</a:t>
+            </a:r>
+            <a:r>
+              <a:rPr lang="es-ES" b="1" dirty="0"/>
+              <a:t>.</a:t>
+            </a:r>
+          </a:p>
+        </p:txBody>
+      </p:sp>
+    </p:spTree>
+    <p:extLst>
+      <p:ext uri="{BB962C8B-B14F-4D97-AF65-F5344CB8AC3E}">
+        <p14:creationId xmlns:p14="http://schemas.microsoft.com/office/powerpoint/2010/main" val="2719857856"/>
+      </p:ext>
+    </p:extLst>
+  </p:cSld>
+  <p:clrMapOvr>
+    <a:masterClrMapping/>
+  </p:clrMapOvr>
+</p:sld>
+</file>
+
+<file path=ppt/slides/slide19.xml><?xml version="1.0" encoding="utf-8"?>
+<p:sld xmlns:a="http://schemas.openxmlformats.org/drawingml/2006/main" xmlns:r="http://schemas.openxmlformats.org/officeDocument/2006/relationships" xmlns:p="http://schemas.openxmlformats.org/presentationml/2006/main">
+  <p:cSld>
+    <p:spTree>
+      <p:nvGrpSpPr>
+        <p:cNvPr id="1" name=""/>
+        <p:cNvGrpSpPr/>
+        <p:nvPr/>
+      </p:nvGrpSpPr>
+      <p:grpSpPr>
+        <a:xfrm>
+          <a:off x="0" y="0"/>
+          <a:ext cx="0" cy="0"/>
+          <a:chOff x="0" y="0"/>
+          <a:chExt cx="0" cy="0"/>
+        </a:xfrm>
+      </p:grpSpPr>
+      <p:sp>
+        <p:nvSpPr>
+          <p:cNvPr id="3" name="CuadroTexto 2">
+            <a:extLst>
+              <a:ext uri="{FF2B5EF4-FFF2-40B4-BE49-F238E27FC236}">
+                <a16:creationId xmlns:a16="http://schemas.microsoft.com/office/drawing/2014/main" id="{EAFA46BE-DCEF-484A-8D7A-29311608D103}"/>
+              </a:ext>
+            </a:extLst>
+          </p:cNvPr>
+          <p:cNvSpPr txBox="1"/>
+          <p:nvPr/>
+        </p:nvSpPr>
+        <p:spPr>
+          <a:xfrm>
+            <a:off x="393031" y="1133980"/>
+            <a:ext cx="11405937" cy="2862322"/>
+          </a:xfrm>
+          <a:prstGeom prst="rect">
+            <a:avLst/>
+          </a:prstGeom>
+          <a:noFill/>
+        </p:spPr>
+        <p:txBody>
+          <a:bodyPr wrap="square">
+            <a:spAutoFit/>
+          </a:bodyPr>
+          <a:lstStyle/>
+          <a:p>
+            <a:r>
+              <a:rPr lang="es-ES" b="1" dirty="0"/>
+              <a:t>Para el registro y el </a:t>
+            </a:r>
+            <a:r>
+              <a:rPr lang="es-ES" b="1" dirty="0" err="1"/>
+              <a:t>login</a:t>
+            </a:r>
+            <a:r>
+              <a:rPr lang="es-ES" b="1" dirty="0"/>
+              <a:t>:</a:t>
+            </a:r>
+          </a:p>
+          <a:p>
+            <a:r>
+              <a:rPr lang="es-ES" dirty="0"/>
+              <a:t>Utilizamos la librería Passport con una estrategia de autenticación local.</a:t>
+            </a:r>
+          </a:p>
+          <a:p>
+            <a:r>
+              <a:rPr lang="es-ES" dirty="0"/>
+              <a:t>Passport rellena automáticamente el parámetro </a:t>
+            </a:r>
+            <a:r>
+              <a:rPr lang="es-ES" dirty="0" err="1"/>
+              <a:t>user</a:t>
+            </a:r>
+            <a:r>
+              <a:rPr lang="es-ES" dirty="0"/>
+              <a:t> que usamos en los </a:t>
+            </a:r>
+            <a:r>
+              <a:rPr lang="es-ES" dirty="0" err="1"/>
+              <a:t>templates</a:t>
+            </a:r>
+            <a:r>
+              <a:rPr lang="es-ES" dirty="0"/>
+              <a:t>.</a:t>
+            </a:r>
+          </a:p>
+          <a:p>
+            <a:r>
+              <a:rPr lang="es-ES" dirty="0"/>
+              <a:t>En los métodos local-</a:t>
+            </a:r>
+            <a:r>
+              <a:rPr lang="es-ES" dirty="0" err="1"/>
+              <a:t>signin</a:t>
+            </a:r>
+            <a:r>
+              <a:rPr lang="es-ES" dirty="0"/>
+              <a:t> y local-</a:t>
+            </a:r>
+            <a:r>
+              <a:rPr lang="es-ES" dirty="0" err="1"/>
+              <a:t>signup</a:t>
+            </a:r>
+            <a:r>
+              <a:rPr lang="es-ES" dirty="0"/>
+              <a:t> se gestionan el registro y </a:t>
+            </a:r>
+            <a:r>
+              <a:rPr lang="es-ES" dirty="0" err="1"/>
+              <a:t>login</a:t>
+            </a:r>
+            <a:r>
+              <a:rPr lang="es-ES" dirty="0"/>
+              <a:t> a la aplicación, haciendo uso de una base de datos.</a:t>
+            </a:r>
+          </a:p>
+          <a:p>
+            <a:endParaRPr lang="es-ES" dirty="0"/>
+          </a:p>
+          <a:p>
+            <a:r>
+              <a:rPr lang="es-ES" b="1" dirty="0"/>
+              <a:t>Base de datos:</a:t>
+            </a:r>
+          </a:p>
+          <a:p>
+            <a:r>
+              <a:rPr lang="es-ES" dirty="0"/>
+              <a:t>Usamos </a:t>
+            </a:r>
+            <a:r>
+              <a:rPr lang="es-ES" dirty="0" err="1"/>
+              <a:t>mongoDB</a:t>
+            </a:r>
+            <a:r>
+              <a:rPr lang="es-ES" dirty="0"/>
+              <a:t>, y para manejarla utilizamos la librería </a:t>
+            </a:r>
+            <a:r>
+              <a:rPr lang="es-ES" dirty="0" err="1"/>
+              <a:t>mongoose</a:t>
+            </a:r>
+            <a:r>
+              <a:rPr lang="es-ES" dirty="0"/>
+              <a:t>.</a:t>
+            </a:r>
+          </a:p>
+          <a:p>
+            <a:r>
+              <a:rPr lang="es-ES" dirty="0" err="1"/>
+              <a:t>Mongoose</a:t>
+            </a:r>
+            <a:r>
+              <a:rPr lang="es-ES" dirty="0"/>
+              <a:t> es un </a:t>
+            </a:r>
+            <a:r>
+              <a:rPr lang="es-ES" dirty="0" err="1"/>
+              <a:t>Object</a:t>
+            </a:r>
+            <a:r>
+              <a:rPr lang="es-ES" dirty="0"/>
+              <a:t> </a:t>
+            </a:r>
+            <a:r>
+              <a:rPr lang="es-ES" dirty="0" err="1"/>
+              <a:t>Relationship</a:t>
+            </a:r>
+            <a:r>
+              <a:rPr lang="es-ES" dirty="0"/>
+              <a:t> Manager; facilita la interacción con la base de datos.</a:t>
+            </a:r>
+          </a:p>
+          <a:p>
+            <a:r>
+              <a:rPr lang="es-ES" dirty="0"/>
+              <a:t>Cuenta con las siguientes colecciones: </a:t>
+            </a:r>
+            <a:r>
+              <a:rPr lang="es-ES" dirty="0" err="1"/>
+              <a:t>adopcions</a:t>
+            </a:r>
+            <a:r>
+              <a:rPr lang="es-ES" dirty="0"/>
+              <a:t>, </a:t>
+            </a:r>
+            <a:r>
+              <a:rPr lang="es-ES" dirty="0" err="1"/>
+              <a:t>catsitters</a:t>
+            </a:r>
+            <a:r>
+              <a:rPr lang="es-ES" dirty="0"/>
+              <a:t>, consejos, incidencias y </a:t>
+            </a:r>
+            <a:r>
+              <a:rPr lang="es-ES" dirty="0" err="1"/>
+              <a:t>users</a:t>
+            </a:r>
+            <a:r>
+              <a:rPr lang="es-ES" dirty="0"/>
+              <a:t>.</a:t>
+            </a:r>
+          </a:p>
+        </p:txBody>
+      </p:sp>
+      <p:sp>
+        <p:nvSpPr>
+          <p:cNvPr id="4" name="Rectangle 1">
+            <a:extLst>
+              <a:ext uri="{FF2B5EF4-FFF2-40B4-BE49-F238E27FC236}">
+                <a16:creationId xmlns:a16="http://schemas.microsoft.com/office/drawing/2014/main" id="{1133A31A-88BE-459E-89F9-4C32FF4F30DA}"/>
+              </a:ext>
+            </a:extLst>
+          </p:cNvPr>
+          <p:cNvSpPr/>
+          <p:nvPr/>
+        </p:nvSpPr>
+        <p:spPr>
+          <a:xfrm>
+            <a:off x="94695" y="106531"/>
+            <a:ext cx="12002610" cy="905523"/>
+          </a:xfrm>
+          <a:prstGeom prst="rect">
+            <a:avLst/>
+          </a:prstGeom>
+          <a:solidFill>
+            <a:schemeClr val="tx1">
+              <a:lumMod val="65000"/>
+              <a:lumOff val="35000"/>
+            </a:schemeClr>
+          </a:solidFill>
+          <a:ln>
+            <a:noFill/>
+          </a:ln>
+        </p:spPr>
+        <p:style>
+          <a:lnRef idx="2">
+            <a:schemeClr val="accent1">
+              <a:shade val="50000"/>
+            </a:schemeClr>
+          </a:lnRef>
+          <a:fillRef idx="1">
+            <a:schemeClr val="accent1"/>
+          </a:fillRef>
+          <a:effectRef idx="0">
+            <a:schemeClr val="accent1"/>
+          </a:effectRef>
+          <a:fontRef idx="minor">
+            <a:schemeClr val="lt1"/>
+          </a:fontRef>
+        </p:style>
+        <p:txBody>
+          <a:bodyPr rtlCol="0" anchor="ctr"/>
+          <a:lstStyle/>
+          <a:p>
+            <a:pPr algn="ctr"/>
+            <a:r>
+              <a:rPr lang="es-VE" b="1" dirty="0">
+                <a:solidFill>
+                  <a:schemeClr val="bg1"/>
+                </a:solidFill>
+              </a:rPr>
+              <a:t>Arquitecturas de Cat-</a:t>
+            </a:r>
+            <a:r>
+              <a:rPr lang="es-VE" b="1" dirty="0" err="1">
+                <a:solidFill>
+                  <a:schemeClr val="bg1"/>
+                </a:solidFill>
+              </a:rPr>
+              <a:t>Attack</a:t>
+            </a:r>
+            <a:endParaRPr lang="en-US" b="1" dirty="0">
+              <a:solidFill>
+                <a:schemeClr val="bg1"/>
+              </a:solidFill>
+            </a:endParaRPr>
+          </a:p>
+        </p:txBody>
+      </p:sp>
+    </p:spTree>
+    <p:extLst>
+      <p:ext uri="{BB962C8B-B14F-4D97-AF65-F5344CB8AC3E}">
+        <p14:creationId xmlns:p14="http://schemas.microsoft.com/office/powerpoint/2010/main" val="2076464582"/>
+      </p:ext>
+    </p:extLst>
+  </p:cSld>
+  <p:clrMapOvr>
+    <a:masterClrMapping/>
+  </p:clrMapOvr>
+</p:sld>
+</file>
+
 <file path=ppt/slides/slide2.xml><?xml version="1.0" encoding="utf-8"?>
 <p:sld xmlns:a="http://schemas.openxmlformats.org/drawingml/2006/main" xmlns:r="http://schemas.openxmlformats.org/officeDocument/2006/relationships" xmlns:p="http://schemas.openxmlformats.org/presentationml/2006/main">
   <p:cSld>
@@ -18967,6 +19698,560 @@
     <p:extLst>
       <p:ext uri="{BB962C8B-B14F-4D97-AF65-F5344CB8AC3E}">
         <p14:creationId xmlns:p14="http://schemas.microsoft.com/office/powerpoint/2010/main" val="1729139466"/>
+      </p:ext>
+    </p:extLst>
+  </p:cSld>
+  <p:clrMapOvr>
+    <a:masterClrMapping/>
+  </p:clrMapOvr>
+</p:sld>
+</file>
+
+<file path=ppt/slides/slide20.xml><?xml version="1.0" encoding="utf-8"?>
+<p:sld xmlns:a="http://schemas.openxmlformats.org/drawingml/2006/main" xmlns:r="http://schemas.openxmlformats.org/officeDocument/2006/relationships" xmlns:p="http://schemas.openxmlformats.org/presentationml/2006/main">
+  <p:cSld>
+    <p:spTree>
+      <p:nvGrpSpPr>
+        <p:cNvPr id="1" name=""/>
+        <p:cNvGrpSpPr/>
+        <p:nvPr/>
+      </p:nvGrpSpPr>
+      <p:grpSpPr>
+        <a:xfrm>
+          <a:off x="0" y="0"/>
+          <a:ext cx="0" cy="0"/>
+          <a:chOff x="0" y="0"/>
+          <a:chExt cx="0" cy="0"/>
+        </a:xfrm>
+      </p:grpSpPr>
+      <p:sp>
+        <p:nvSpPr>
+          <p:cNvPr id="2" name="Rectangle 1">
+            <a:extLst>
+              <a:ext uri="{FF2B5EF4-FFF2-40B4-BE49-F238E27FC236}">
+                <a16:creationId xmlns:a16="http://schemas.microsoft.com/office/drawing/2014/main" id="{C495F863-77F6-4304-99CA-84658ADCCA32}"/>
+              </a:ext>
+            </a:extLst>
+          </p:cNvPr>
+          <p:cNvSpPr/>
+          <p:nvPr/>
+        </p:nvSpPr>
+        <p:spPr>
+          <a:xfrm>
+            <a:off x="94695" y="106531"/>
+            <a:ext cx="12002610" cy="905523"/>
+          </a:xfrm>
+          <a:prstGeom prst="rect">
+            <a:avLst/>
+          </a:prstGeom>
+          <a:solidFill>
+            <a:schemeClr val="tx1">
+              <a:lumMod val="65000"/>
+              <a:lumOff val="35000"/>
+            </a:schemeClr>
+          </a:solidFill>
+          <a:ln>
+            <a:noFill/>
+          </a:ln>
+        </p:spPr>
+        <p:style>
+          <a:lnRef idx="2">
+            <a:schemeClr val="accent1">
+              <a:shade val="50000"/>
+            </a:schemeClr>
+          </a:lnRef>
+          <a:fillRef idx="1">
+            <a:schemeClr val="accent1"/>
+          </a:fillRef>
+          <a:effectRef idx="0">
+            <a:schemeClr val="accent1"/>
+          </a:effectRef>
+          <a:fontRef idx="minor">
+            <a:schemeClr val="lt1"/>
+          </a:fontRef>
+        </p:style>
+        <p:txBody>
+          <a:bodyPr rtlCol="0" anchor="ctr"/>
+          <a:lstStyle/>
+          <a:p>
+            <a:pPr algn="ctr"/>
+            <a:r>
+              <a:rPr lang="es-VE" b="1" dirty="0">
+                <a:solidFill>
+                  <a:schemeClr val="bg1"/>
+                </a:solidFill>
+              </a:rPr>
+              <a:t>Arquitecturas de Cat-</a:t>
+            </a:r>
+            <a:r>
+              <a:rPr lang="es-VE" b="1" dirty="0" err="1">
+                <a:solidFill>
+                  <a:schemeClr val="bg1"/>
+                </a:solidFill>
+              </a:rPr>
+              <a:t>Attack</a:t>
+            </a:r>
+            <a:endParaRPr lang="en-US" b="1" dirty="0">
+              <a:solidFill>
+                <a:schemeClr val="bg1"/>
+              </a:solidFill>
+            </a:endParaRPr>
+          </a:p>
+        </p:txBody>
+      </p:sp>
+      <p:sp>
+        <p:nvSpPr>
+          <p:cNvPr id="3" name="CuadroTexto 2">
+            <a:extLst>
+              <a:ext uri="{FF2B5EF4-FFF2-40B4-BE49-F238E27FC236}">
+                <a16:creationId xmlns:a16="http://schemas.microsoft.com/office/drawing/2014/main" id="{50EDCBFA-CB33-4F20-80D5-6F9C621CFAFC}"/>
+              </a:ext>
+            </a:extLst>
+          </p:cNvPr>
+          <p:cNvSpPr txBox="1"/>
+          <p:nvPr/>
+        </p:nvSpPr>
+        <p:spPr>
+          <a:xfrm>
+            <a:off x="393031" y="1133980"/>
+            <a:ext cx="11405937" cy="5078313"/>
+          </a:xfrm>
+          <a:prstGeom prst="rect">
+            <a:avLst/>
+          </a:prstGeom>
+          <a:noFill/>
+        </p:spPr>
+        <p:txBody>
+          <a:bodyPr wrap="square">
+            <a:spAutoFit/>
+          </a:bodyPr>
+          <a:lstStyle/>
+          <a:p>
+            <a:r>
+              <a:rPr lang="es-ES" dirty="0"/>
+              <a:t>La pantalla inicial es la de </a:t>
+            </a:r>
+            <a:r>
+              <a:rPr lang="es-ES" dirty="0" err="1"/>
+              <a:t>Login</a:t>
+            </a:r>
+            <a:r>
+              <a:rPr lang="es-ES" dirty="0"/>
+              <a:t>. Tiene 3 opciones principales: acceder al formulario de registro, validar las credenciales del formulario de </a:t>
+            </a:r>
+            <a:r>
+              <a:rPr lang="es-ES" dirty="0" err="1"/>
+              <a:t>login</a:t>
+            </a:r>
+            <a:r>
+              <a:rPr lang="es-ES" dirty="0"/>
+              <a:t> para acceder a la aplicación (</a:t>
+            </a:r>
+            <a:r>
+              <a:rPr lang="es-ES" dirty="0" err="1"/>
+              <a:t>login</a:t>
+            </a:r>
+            <a:r>
+              <a:rPr lang="es-ES" dirty="0"/>
+              <a:t> normal), o acceder como invitado sin necesidad de credenciales.</a:t>
+            </a:r>
+          </a:p>
+          <a:p>
+            <a:endParaRPr lang="es-ES" dirty="0"/>
+          </a:p>
+          <a:p>
+            <a:r>
+              <a:rPr lang="es-ES" dirty="0"/>
+              <a:t>Al </a:t>
+            </a:r>
+            <a:r>
+              <a:rPr lang="es-ES" dirty="0" err="1"/>
+              <a:t>loguear</a:t>
+            </a:r>
+            <a:r>
+              <a:rPr lang="es-ES" dirty="0"/>
+              <a:t> de manera correcta, el usuario será redirigido al </a:t>
+            </a:r>
+            <a:r>
+              <a:rPr lang="es-ES" dirty="0" err="1"/>
+              <a:t>dashboard</a:t>
+            </a:r>
+            <a:r>
+              <a:rPr lang="es-ES" dirty="0"/>
+              <a:t>, la página principal de Cat-</a:t>
+            </a:r>
+            <a:r>
+              <a:rPr lang="es-ES" dirty="0" err="1"/>
+              <a:t>Attack</a:t>
+            </a:r>
+            <a:r>
+              <a:rPr lang="es-ES" dirty="0"/>
+              <a:t>. Desde aquí, tiene acceso a un </a:t>
+            </a:r>
+            <a:r>
+              <a:rPr lang="es-ES" dirty="0" err="1"/>
+              <a:t>nav-var</a:t>
+            </a:r>
+            <a:r>
+              <a:rPr lang="es-ES" dirty="0"/>
+              <a:t> situado en la parte superior de la pantalla que le permitirá moverse a las diferentes páginas de la aplicación. </a:t>
+            </a:r>
+          </a:p>
+          <a:p>
+            <a:endParaRPr lang="es-ES" dirty="0"/>
+          </a:p>
+          <a:p>
+            <a:r>
+              <a:rPr lang="es-ES" dirty="0"/>
+              <a:t>Un usuario normal tiene acceso a las siguientes páginas: Inicio (el propio </a:t>
+            </a:r>
+            <a:r>
+              <a:rPr lang="es-ES" dirty="0" err="1"/>
+              <a:t>dashboard</a:t>
+            </a:r>
+            <a:r>
+              <a:rPr lang="es-ES" dirty="0"/>
+              <a:t>), Adopción, Consejos, Cat-</a:t>
+            </a:r>
+            <a:r>
+              <a:rPr lang="es-ES" dirty="0" err="1"/>
+              <a:t>sitters</a:t>
+            </a:r>
+            <a:r>
+              <a:rPr lang="es-ES" dirty="0"/>
+              <a:t>, Mi perfil y Chat.</a:t>
+            </a:r>
+          </a:p>
+          <a:p>
+            <a:endParaRPr lang="es-ES" dirty="0"/>
+          </a:p>
+          <a:p>
+            <a:r>
+              <a:rPr lang="es-ES" dirty="0"/>
+              <a:t>El usuario invitado tiene acceso a las todas páginas anteriores excepto al chat. No puede acceder a formularios de adopción o </a:t>
+            </a:r>
+            <a:r>
+              <a:rPr lang="es-ES" dirty="0" err="1"/>
+              <a:t>catsitting</a:t>
+            </a:r>
+            <a:r>
+              <a:rPr lang="es-ES" dirty="0"/>
+              <a:t>, enviar incidencias o modificar el perfil.</a:t>
+            </a:r>
+          </a:p>
+          <a:p>
+            <a:endParaRPr lang="es-ES" dirty="0"/>
+          </a:p>
+          <a:p>
+            <a:r>
+              <a:rPr lang="es-ES" dirty="0"/>
+              <a:t>Un usuario privilegiado (administrador) tiene acceso a todas las páginas anteriores, junto con una sección adicional de incidencias.</a:t>
+            </a:r>
+          </a:p>
+          <a:p>
+            <a:endParaRPr lang="es-ES" dirty="0"/>
+          </a:p>
+          <a:p>
+            <a:r>
+              <a:rPr lang="es-ES" dirty="0"/>
+              <a:t>Todos los usuarios cuentan con un botón de </a:t>
+            </a:r>
+            <a:r>
+              <a:rPr lang="es-ES" dirty="0" err="1"/>
+              <a:t>Logout</a:t>
+            </a:r>
+            <a:r>
+              <a:rPr lang="es-ES" dirty="0"/>
+              <a:t> en su </a:t>
+            </a:r>
+            <a:r>
+              <a:rPr lang="es-ES" dirty="0" err="1"/>
+              <a:t>nav-var</a:t>
+            </a:r>
+            <a:r>
+              <a:rPr lang="es-ES" dirty="0"/>
+              <a:t> para cerrar sesión en la aplicación.</a:t>
+            </a:r>
+          </a:p>
+        </p:txBody>
+      </p:sp>
+    </p:spTree>
+    <p:extLst>
+      <p:ext uri="{BB962C8B-B14F-4D97-AF65-F5344CB8AC3E}">
+        <p14:creationId xmlns:p14="http://schemas.microsoft.com/office/powerpoint/2010/main" val="3319403464"/>
+      </p:ext>
+    </p:extLst>
+  </p:cSld>
+  <p:clrMapOvr>
+    <a:masterClrMapping/>
+  </p:clrMapOvr>
+</p:sld>
+</file>
+
+<file path=ppt/slides/slide21.xml><?xml version="1.0" encoding="utf-8"?>
+<p:sld xmlns:a="http://schemas.openxmlformats.org/drawingml/2006/main" xmlns:r="http://schemas.openxmlformats.org/officeDocument/2006/relationships" xmlns:p="http://schemas.openxmlformats.org/presentationml/2006/main">
+  <p:cSld>
+    <p:spTree>
+      <p:nvGrpSpPr>
+        <p:cNvPr id="1" name=""/>
+        <p:cNvGrpSpPr/>
+        <p:nvPr/>
+      </p:nvGrpSpPr>
+      <p:grpSpPr>
+        <a:xfrm>
+          <a:off x="0" y="0"/>
+          <a:ext cx="0" cy="0"/>
+          <a:chOff x="0" y="0"/>
+          <a:chExt cx="0" cy="0"/>
+        </a:xfrm>
+      </p:grpSpPr>
+      <p:sp>
+        <p:nvSpPr>
+          <p:cNvPr id="2" name="Rectangle 1">
+            <a:extLst>
+              <a:ext uri="{FF2B5EF4-FFF2-40B4-BE49-F238E27FC236}">
+                <a16:creationId xmlns:a16="http://schemas.microsoft.com/office/drawing/2014/main" id="{C495F863-77F6-4304-99CA-84658ADCCA32}"/>
+              </a:ext>
+            </a:extLst>
+          </p:cNvPr>
+          <p:cNvSpPr/>
+          <p:nvPr/>
+        </p:nvSpPr>
+        <p:spPr>
+          <a:xfrm>
+            <a:off x="94695" y="106531"/>
+            <a:ext cx="12002610" cy="905523"/>
+          </a:xfrm>
+          <a:prstGeom prst="rect">
+            <a:avLst/>
+          </a:prstGeom>
+          <a:solidFill>
+            <a:schemeClr val="tx1">
+              <a:lumMod val="65000"/>
+              <a:lumOff val="35000"/>
+            </a:schemeClr>
+          </a:solidFill>
+          <a:ln>
+            <a:noFill/>
+          </a:ln>
+        </p:spPr>
+        <p:style>
+          <a:lnRef idx="2">
+            <a:schemeClr val="accent1">
+              <a:shade val="50000"/>
+            </a:schemeClr>
+          </a:lnRef>
+          <a:fillRef idx="1">
+            <a:schemeClr val="accent1"/>
+          </a:fillRef>
+          <a:effectRef idx="0">
+            <a:schemeClr val="accent1"/>
+          </a:effectRef>
+          <a:fontRef idx="minor">
+            <a:schemeClr val="lt1"/>
+          </a:fontRef>
+        </p:style>
+        <p:txBody>
+          <a:bodyPr rtlCol="0" anchor="ctr"/>
+          <a:lstStyle/>
+          <a:p>
+            <a:pPr algn="ctr"/>
+            <a:r>
+              <a:rPr lang="es-VE" b="1" dirty="0">
+                <a:solidFill>
+                  <a:schemeClr val="bg1"/>
+                </a:solidFill>
+              </a:rPr>
+              <a:t>Arquitecturas de Cat-</a:t>
+            </a:r>
+            <a:r>
+              <a:rPr lang="es-VE" b="1" dirty="0" err="1">
+                <a:solidFill>
+                  <a:schemeClr val="bg1"/>
+                </a:solidFill>
+              </a:rPr>
+              <a:t>Attack</a:t>
+            </a:r>
+            <a:endParaRPr lang="en-US" b="1" dirty="0">
+              <a:solidFill>
+                <a:schemeClr val="bg1"/>
+              </a:solidFill>
+            </a:endParaRPr>
+          </a:p>
+        </p:txBody>
+      </p:sp>
+      <p:sp>
+        <p:nvSpPr>
+          <p:cNvPr id="3" name="CuadroTexto 2">
+            <a:extLst>
+              <a:ext uri="{FF2B5EF4-FFF2-40B4-BE49-F238E27FC236}">
+                <a16:creationId xmlns:a16="http://schemas.microsoft.com/office/drawing/2014/main" id="{50EDCBFA-CB33-4F20-80D5-6F9C621CFAFC}"/>
+              </a:ext>
+            </a:extLst>
+          </p:cNvPr>
+          <p:cNvSpPr txBox="1"/>
+          <p:nvPr/>
+        </p:nvSpPr>
+        <p:spPr>
+          <a:xfrm>
+            <a:off x="393031" y="1133980"/>
+            <a:ext cx="11405937" cy="5632311"/>
+          </a:xfrm>
+          <a:prstGeom prst="rect">
+            <a:avLst/>
+          </a:prstGeom>
+          <a:noFill/>
+        </p:spPr>
+        <p:txBody>
+          <a:bodyPr wrap="square">
+            <a:spAutoFit/>
+          </a:bodyPr>
+          <a:lstStyle/>
+          <a:p>
+            <a:r>
+              <a:rPr lang="es-ES" b="1" dirty="0"/>
+              <a:t>Adopción:</a:t>
+            </a:r>
+          </a:p>
+          <a:p>
+            <a:r>
+              <a:rPr lang="es-ES" dirty="0"/>
+              <a:t>El usuario puede visualizar la lista de gatos en adopción de la aplicación, y acceder al formulario para poner un gato en adopción. También puede reportar una incidencia en cualquier anuncio de adopción.</a:t>
+            </a:r>
+          </a:p>
+          <a:p>
+            <a:r>
+              <a:rPr lang="es-ES" b="1" dirty="0"/>
+              <a:t>Consejos:</a:t>
+            </a:r>
+          </a:p>
+          <a:p>
+            <a:r>
+              <a:rPr lang="es-ES" dirty="0"/>
+              <a:t>El usuario puede visualizar la lista de consejos de la aplicación. También puede pulsar el botón de ampliar en cualquier consejo para visualizar la información en un formato más grande. </a:t>
+            </a:r>
+            <a:r>
+              <a:rPr lang="es-ES" dirty="0">
+                <a:solidFill>
+                  <a:srgbClr val="FF0000"/>
+                </a:solidFill>
+              </a:rPr>
+              <a:t>El administrador puede publicar nuevos consejos.</a:t>
+            </a:r>
+          </a:p>
+          <a:p>
+            <a:r>
+              <a:rPr lang="es-ES" b="1" dirty="0" err="1"/>
+              <a:t>Catsitting</a:t>
+            </a:r>
+            <a:r>
+              <a:rPr lang="es-ES" b="1" dirty="0"/>
+              <a:t>:</a:t>
+            </a:r>
+          </a:p>
+          <a:p>
+            <a:r>
+              <a:rPr lang="es-ES" dirty="0"/>
+              <a:t>El usuario puede visualizar la lista de </a:t>
+            </a:r>
+            <a:r>
+              <a:rPr lang="es-ES" dirty="0" err="1"/>
+              <a:t>catsitters</a:t>
+            </a:r>
+            <a:r>
+              <a:rPr lang="es-ES" dirty="0"/>
+              <a:t> de la aplicación, y acceder al formulario para registrarse como </a:t>
+            </a:r>
+            <a:r>
+              <a:rPr lang="es-ES" dirty="0" err="1"/>
+              <a:t>catsitter</a:t>
+            </a:r>
+            <a:r>
+              <a:rPr lang="es-ES" dirty="0"/>
+              <a:t>.</a:t>
+            </a:r>
+          </a:p>
+          <a:p>
+            <a:r>
+              <a:rPr lang="es-ES" b="1" dirty="0"/>
+              <a:t>Mi perfil:</a:t>
+            </a:r>
+          </a:p>
+          <a:p>
+            <a:r>
+              <a:rPr lang="es-ES" dirty="0"/>
+              <a:t>El usuario puede visualizar su perfil. También cuenta con la opción de cambiar su contraseña o su foto de perfil.</a:t>
+            </a:r>
+          </a:p>
+          <a:p>
+            <a:r>
+              <a:rPr lang="es-ES" b="1" dirty="0"/>
+              <a:t>Chat:</a:t>
+            </a:r>
+          </a:p>
+          <a:p>
+            <a:r>
+              <a:rPr lang="es-ES" dirty="0"/>
+              <a:t>El usuario puede entrar a chatear con otros usuarios que también estén conectados a la aplicación.</a:t>
+            </a:r>
+          </a:p>
+          <a:p>
+            <a:r>
+              <a:rPr lang="es-ES" b="1" dirty="0">
+                <a:solidFill>
+                  <a:srgbClr val="FF0000"/>
+                </a:solidFill>
+              </a:rPr>
+              <a:t>Incidencias:</a:t>
+            </a:r>
+          </a:p>
+          <a:p>
+            <a:r>
+              <a:rPr lang="es-ES" dirty="0">
+                <a:solidFill>
+                  <a:srgbClr val="FF0000"/>
+                </a:solidFill>
+              </a:rPr>
+              <a:t>El administrador puede visualizar las incidencias de los usuarios para borrarlas o resolverlas.</a:t>
+            </a:r>
+          </a:p>
+          <a:p>
+            <a:r>
+              <a:rPr lang="es-ES" b="1" dirty="0" err="1"/>
+              <a:t>Logout</a:t>
+            </a:r>
+            <a:r>
+              <a:rPr lang="es-ES" b="1" dirty="0"/>
+              <a:t>:</a:t>
+            </a:r>
+          </a:p>
+          <a:p>
+            <a:r>
+              <a:rPr lang="es-ES" dirty="0"/>
+              <a:t>El usuario cierra sesión en la aplicación y es devuelto a la pantalla de </a:t>
+            </a:r>
+            <a:r>
+              <a:rPr lang="es-ES" dirty="0" err="1"/>
+              <a:t>Login</a:t>
+            </a:r>
+            <a:r>
+              <a:rPr lang="es-ES" dirty="0"/>
+              <a:t>.</a:t>
+            </a:r>
+          </a:p>
+          <a:p>
+            <a:endParaRPr lang="es-ES" b="1" dirty="0">
+              <a:solidFill>
+                <a:srgbClr val="FF0000"/>
+              </a:solidFill>
+            </a:endParaRPr>
+          </a:p>
+        </p:txBody>
+      </p:sp>
+    </p:spTree>
+    <p:extLst>
+      <p:ext uri="{BB962C8B-B14F-4D97-AF65-F5344CB8AC3E}">
+        <p14:creationId xmlns:p14="http://schemas.microsoft.com/office/powerpoint/2010/main" val="1642705686"/>
       </p:ext>
     </p:extLst>
   </p:cSld>

</xml_diff>

<commit_message>
Cambio del color de los botones del login.
</commit_message>
<xml_diff>
--- a/Docs/Documento de diseño Cat-Attack.pptx
+++ b/Docs/Documento de diseño Cat-Attack.pptx
@@ -19406,7 +19406,7 @@
             <a:avLst/>
           </a:prstGeom>
           <a:solidFill>
-            <a:srgbClr val="00B0F0"/>
+            <a:srgbClr val="0070C0"/>
           </a:solidFill>
           <a:ln>
             <a:noFill/>
@@ -19534,7 +19534,7 @@
             <a:avLst/>
           </a:prstGeom>
           <a:solidFill>
-            <a:srgbClr val="00B050"/>
+            <a:srgbClr val="0070C0"/>
           </a:solidFill>
           <a:ln>
             <a:noFill/>

</xml_diff>